<commit_message>
Izmenjena greska u kucanju
</commit_message>
<xml_diff>
--- a/SEEIPS presetantion.pptx
+++ b/SEEIPS presetantion.pptx
@@ -229,7 +229,7 @@
           <a:p>
             <a:fld id="{ECB6AE8D-602F-4F17-A62A-C3460869C121}" type="datetimeFigureOut">
               <a:rPr lang="en-US" smtClean="0"/>
-              <a:t>14-Apr-19</a:t>
+              <a:t>15-Apr-19</a:t>
             </a:fld>
             <a:endParaRPr lang="en-US"/>
           </a:p>
@@ -972,7 +972,7 @@
             <a:fld id="{53074F12-AA26-4AC8-9962-C36BB8F32554}" type="datetimeFigureOut">
               <a:rPr lang="en-US" smtClean="0"/>
               <a:pPr/>
-              <a:t>14-Apr-19</a:t>
+              <a:t>15-Apr-19</a:t>
             </a:fld>
             <a:endParaRPr lang="en-US"/>
           </a:p>
@@ -1227,7 +1227,7 @@
             <a:fld id="{53074F12-AA26-4AC8-9962-C36BB8F32554}" type="datetimeFigureOut">
               <a:rPr lang="en-US" smtClean="0"/>
               <a:pPr/>
-              <a:t>14-Apr-19</a:t>
+              <a:t>15-Apr-19</a:t>
             </a:fld>
             <a:endParaRPr lang="en-US"/>
           </a:p>
@@ -1399,7 +1399,7 @@
             <a:fld id="{53074F12-AA26-4AC8-9962-C36BB8F32554}" type="datetimeFigureOut">
               <a:rPr lang="en-US" smtClean="0"/>
               <a:pPr/>
-              <a:t>14-Apr-19</a:t>
+              <a:t>15-Apr-19</a:t>
             </a:fld>
             <a:endParaRPr lang="en-US"/>
           </a:p>
@@ -1581,7 +1581,7 @@
             <a:fld id="{53074F12-AA26-4AC8-9962-C36BB8F32554}" type="datetimeFigureOut">
               <a:rPr lang="en-US" smtClean="0"/>
               <a:pPr/>
-              <a:t>14-Apr-19</a:t>
+              <a:t>15-Apr-19</a:t>
             </a:fld>
             <a:endParaRPr lang="en-US"/>
           </a:p>
@@ -1809,7 +1809,7 @@
             <a:fld id="{53074F12-AA26-4AC8-9962-C36BB8F32554}" type="datetimeFigureOut">
               <a:rPr lang="en-US" smtClean="0"/>
               <a:pPr/>
-              <a:t>14-Apr-19</a:t>
+              <a:t>15-Apr-19</a:t>
             </a:fld>
             <a:endParaRPr lang="en-US"/>
           </a:p>
@@ -2037,7 +2037,7 @@
             <a:fld id="{53074F12-AA26-4AC8-9962-C36BB8F32554}" type="datetimeFigureOut">
               <a:rPr lang="en-US" smtClean="0"/>
               <a:pPr/>
-              <a:t>14-Apr-19</a:t>
+              <a:t>15-Apr-19</a:t>
             </a:fld>
             <a:endParaRPr lang="en-US"/>
           </a:p>
@@ -2285,7 +2285,7 @@
             <a:fld id="{53074F12-AA26-4AC8-9962-C36BB8F32554}" type="datetimeFigureOut">
               <a:rPr lang="en-US" smtClean="0"/>
               <a:pPr/>
-              <a:t>14-Apr-19</a:t>
+              <a:t>15-Apr-19</a:t>
             </a:fld>
             <a:endParaRPr lang="en-US"/>
           </a:p>
@@ -2575,7 +2575,7 @@
             <a:fld id="{53074F12-AA26-4AC8-9962-C36BB8F32554}" type="datetimeFigureOut">
               <a:rPr lang="en-US" smtClean="0"/>
               <a:pPr/>
-              <a:t>14-Apr-19</a:t>
+              <a:t>15-Apr-19</a:t>
             </a:fld>
             <a:endParaRPr lang="en-US"/>
           </a:p>
@@ -3058,7 +3058,7 @@
             <a:fld id="{53074F12-AA26-4AC8-9962-C36BB8F32554}" type="datetimeFigureOut">
               <a:rPr lang="en-US" smtClean="0"/>
               <a:pPr/>
-              <a:t>14-Apr-19</a:t>
+              <a:t>15-Apr-19</a:t>
             </a:fld>
             <a:endParaRPr lang="en-US"/>
           </a:p>
@@ -3178,7 +3178,7 @@
             <a:fld id="{53074F12-AA26-4AC8-9962-C36BB8F32554}" type="datetimeFigureOut">
               <a:rPr lang="en-US" smtClean="0"/>
               <a:pPr/>
-              <a:t>14-Apr-19</a:t>
+              <a:t>15-Apr-19</a:t>
             </a:fld>
             <a:endParaRPr lang="en-US"/>
           </a:p>
@@ -3275,7 +3275,7 @@
             <a:fld id="{53074F12-AA26-4AC8-9962-C36BB8F32554}" type="datetimeFigureOut">
               <a:rPr lang="en-US" smtClean="0"/>
               <a:pPr/>
-              <a:t>14-Apr-19</a:t>
+              <a:t>15-Apr-19</a:t>
             </a:fld>
             <a:endParaRPr lang="en-US"/>
           </a:p>
@@ -3554,7 +3554,7 @@
             <a:fld id="{53074F12-AA26-4AC8-9962-C36BB8F32554}" type="datetimeFigureOut">
               <a:rPr lang="en-US" smtClean="0"/>
               <a:pPr/>
-              <a:t>14-Apr-19</a:t>
+              <a:t>15-Apr-19</a:t>
             </a:fld>
             <a:endParaRPr lang="en-US"/>
           </a:p>
@@ -3778,7 +3778,7 @@
             <a:fld id="{53074F12-AA26-4AC8-9962-C36BB8F32554}" type="datetimeFigureOut">
               <a:rPr lang="en-US" smtClean="0"/>
               <a:pPr/>
-              <a:t>14-Apr-19</a:t>
+              <a:t>15-Apr-19</a:t>
             </a:fld>
             <a:endParaRPr lang="en-US"/>
           </a:p>
@@ -4568,7 +4568,6 @@
               <a:rPr lang="sr-Latn-RS" dirty="0" smtClean="0"/>
               <a:t>Work packages</a:t>
             </a:r>
-            <a:endParaRPr lang="sr-Latn-RS" dirty="0" smtClean="0"/>
           </a:p>
           <a:p>
             <a:r>
@@ -4937,7 +4936,19 @@
             </a:r>
             <a:r>
               <a:rPr lang="en-US" dirty="0" smtClean="0"/>
-              <a:t> 01.03.2022.</a:t>
+              <a:t> </a:t>
+            </a:r>
+            <a:r>
+              <a:rPr lang="en-US" dirty="0" smtClean="0"/>
+              <a:t>01.03.202</a:t>
+            </a:r>
+            <a:r>
+              <a:rPr lang="sr-Latn-RS"/>
+              <a:t>2</a:t>
+            </a:r>
+            <a:r>
+              <a:rPr lang="en-US" smtClean="0"/>
+              <a:t>.</a:t>
             </a:r>
             <a:endParaRPr lang="sr-Latn-RS" dirty="0" smtClean="0"/>
           </a:p>

</xml_diff>